<commit_message>
added values to ppt
</commit_message>
<xml_diff>
--- a/PPT Docs/PPT.pptx
+++ b/PPT Docs/PPT.pptx
@@ -7,10 +7,10 @@
   <p:sldIdLst>
     <p:sldId id="263" r:id="rId2"/>
     <p:sldId id="256" r:id="rId3"/>
-    <p:sldId id="257" r:id="rId4"/>
-    <p:sldId id="258" r:id="rId5"/>
-    <p:sldId id="260" r:id="rId6"/>
-    <p:sldId id="261" r:id="rId7"/>
+    <p:sldId id="264" r:id="rId4"/>
+    <p:sldId id="257" r:id="rId5"/>
+    <p:sldId id="258" r:id="rId6"/>
+    <p:sldId id="260" r:id="rId7"/>
     <p:sldId id="262" r:id="rId8"/>
   </p:sldIdLst>
   <p:sldSz cx="12192000" cy="6858000"/>
@@ -127,36 +127,6 @@
     </mc:Fallback>
   </mc:AlternateContent>
   <c:chart>
-    <c:title>
-      <c:overlay val="0"/>
-      <c:spPr>
-        <a:noFill/>
-        <a:ln>
-          <a:noFill/>
-        </a:ln>
-        <a:effectLst/>
-      </c:spPr>
-      <c:txPr>
-        <a:bodyPr rot="0" spcFirstLastPara="1" vertOverflow="ellipsis" vert="horz" wrap="square" anchor="ctr" anchorCtr="1"/>
-        <a:lstStyle/>
-        <a:p>
-          <a:pPr>
-            <a:defRPr sz="1862" b="0" i="0" u="none" strike="noStrike" kern="1200" spc="0" baseline="0">
-              <a:solidFill>
-                <a:schemeClr val="tx1">
-                  <a:lumMod val="65000"/>
-                  <a:lumOff val="35000"/>
-                </a:schemeClr>
-              </a:solidFill>
-              <a:latin typeface="+mn-lt"/>
-              <a:ea typeface="+mn-ea"/>
-              <a:cs typeface="+mn-cs"/>
-            </a:defRPr>
-          </a:pPr>
-          <a:endParaRPr lang="en-US"/>
-        </a:p>
-      </c:txPr>
-    </c:title>
     <c:autoTitleDeleted val="0"/>
     <c:plotArea>
       <c:layout/>
@@ -173,7 +143,7 @@
               <c:strCache>
                 <c:ptCount val="1"/>
                 <c:pt idx="0">
-                  <c:v>RMSE</c:v>
+                  <c:v>Glove</c:v>
                 </c:pt>
               </c:strCache>
             </c:strRef>
@@ -226,6 +196,71 @@
           <c:extLst>
             <c:ext xmlns:c16="http://schemas.microsoft.com/office/drawing/2014/chart" uri="{C3380CC4-5D6E-409C-BE32-E72D297353CC}">
               <c16:uniqueId val="{00000000-86F8-0C4B-9EFC-D8D28E5BEEF1}"/>
+            </c:ext>
+          </c:extLst>
+        </c:ser>
+        <c:ser>
+          <c:idx val="1"/>
+          <c:order val="1"/>
+          <c:tx>
+            <c:strRef>
+              <c:f>Sheet1!$C$1</c:f>
+              <c:strCache>
+                <c:ptCount val="1"/>
+                <c:pt idx="0">
+                  <c:v>word2vec</c:v>
+                </c:pt>
+              </c:strCache>
+            </c:strRef>
+          </c:tx>
+          <c:spPr>
+            <a:solidFill>
+              <a:schemeClr val="accent2"/>
+            </a:solidFill>
+            <a:ln>
+              <a:noFill/>
+            </a:ln>
+            <a:effectLst/>
+          </c:spPr>
+          <c:invertIfNegative val="0"/>
+          <c:cat>
+            <c:strRef>
+              <c:f>Sheet1!$A$2:$A$4</c:f>
+              <c:strCache>
+                <c:ptCount val="3"/>
+                <c:pt idx="0">
+                  <c:v>LSTM</c:v>
+                </c:pt>
+                <c:pt idx="1">
+                  <c:v>GRU</c:v>
+                </c:pt>
+                <c:pt idx="2">
+                  <c:v>RNN</c:v>
+                </c:pt>
+              </c:strCache>
+            </c:strRef>
+          </c:cat>
+          <c:val>
+            <c:numRef>
+              <c:f>Sheet1!$C$2:$C$4</c:f>
+              <c:numCache>
+                <c:formatCode>General</c:formatCode>
+                <c:ptCount val="3"/>
+                <c:pt idx="0">
+                  <c:v>0.16919999999999999</c:v>
+                </c:pt>
+                <c:pt idx="1">
+                  <c:v>0.17851</c:v>
+                </c:pt>
+                <c:pt idx="2">
+                  <c:v>0.18509999999999999</c:v>
+                </c:pt>
+              </c:numCache>
+            </c:numRef>
+          </c:val>
+          <c:extLst>
+            <c:ext xmlns:c16="http://schemas.microsoft.com/office/drawing/2014/chart" uri="{C3380CC4-5D6E-409C-BE32-E72D297353CC}">
+              <c16:uniqueId val="{00000001-86F8-0C4B-9EFC-D8D28E5BEEF1}"/>
             </c:ext>
           </c:extLst>
         </c:ser>
@@ -4344,6 +4379,104 @@
           <p:cNvPr id="2" name="Title 1">
             <a:extLst>
               <a:ext uri="{FF2B5EF4-FFF2-40B4-BE49-F238E27FC236}">
+                <a16:creationId xmlns:a16="http://schemas.microsoft.com/office/drawing/2014/main" id="{A9B81700-2FEA-5241-93E6-1C1C913C8600}"/>
+              </a:ext>
+            </a:extLst>
+          </p:cNvPr>
+          <p:cNvSpPr>
+            <a:spLocks noGrp="1"/>
+          </p:cNvSpPr>
+          <p:nvPr>
+            <p:ph type="title"/>
+          </p:nvPr>
+        </p:nvSpPr>
+        <p:spPr/>
+        <p:txBody>
+          <a:bodyPr/>
+          <a:lstStyle/>
+          <a:p>
+            <a:r>
+              <a:rPr lang="en-US" dirty="0"/>
+              <a:t>Methodologies and technologies used</a:t>
+            </a:r>
+          </a:p>
+        </p:txBody>
+      </p:sp>
+      <p:sp>
+        <p:nvSpPr>
+          <p:cNvPr id="3" name="Content Placeholder 2">
+            <a:extLst>
+              <a:ext uri="{FF2B5EF4-FFF2-40B4-BE49-F238E27FC236}">
+                <a16:creationId xmlns:a16="http://schemas.microsoft.com/office/drawing/2014/main" id="{0EC89E82-C5EC-644D-BC58-2EBF8E8ABB09}"/>
+              </a:ext>
+            </a:extLst>
+          </p:cNvPr>
+          <p:cNvSpPr>
+            <a:spLocks noGrp="1"/>
+          </p:cNvSpPr>
+          <p:nvPr>
+            <p:ph idx="1"/>
+          </p:nvPr>
+        </p:nvSpPr>
+        <p:spPr/>
+        <p:txBody>
+          <a:bodyPr/>
+          <a:lstStyle/>
+          <a:p>
+            <a:r>
+              <a:rPr lang="en-US" dirty="0"/>
+              <a:t>Write technologies </a:t>
+            </a:r>
+          </a:p>
+          <a:p>
+            <a:r>
+              <a:rPr lang="en-US" dirty="0"/>
+              <a:t>Write data set and tell about it</a:t>
+            </a:r>
+          </a:p>
+          <a:p>
+            <a:r>
+              <a:rPr lang="en-US" dirty="0"/>
+              <a:t>Write the models we are using</a:t>
+            </a:r>
+          </a:p>
+        </p:txBody>
+      </p:sp>
+    </p:spTree>
+    <p:extLst>
+      <p:ext uri="{BB962C8B-B14F-4D97-AF65-F5344CB8AC3E}">
+        <p14:creationId xmlns:p14="http://schemas.microsoft.com/office/powerpoint/2010/main" val="286988959"/>
+      </p:ext>
+    </p:extLst>
+  </p:cSld>
+  <p:clrMapOvr>
+    <a:masterClrMapping/>
+  </p:clrMapOvr>
+</p:sld>
+</file>
+
+<file path=ppt/slides/slide4.xml><?xml version="1.0" encoding="utf-8"?>
+<p:sld xmlns:a="http://schemas.openxmlformats.org/drawingml/2006/main" xmlns:r="http://schemas.openxmlformats.org/officeDocument/2006/relationships" xmlns:p="http://schemas.openxmlformats.org/presentationml/2006/main">
+  <p:cSld>
+    <p:spTree>
+      <p:nvGrpSpPr>
+        <p:cNvPr id="1" name=""/>
+        <p:cNvGrpSpPr/>
+        <p:nvPr/>
+      </p:nvGrpSpPr>
+      <p:grpSpPr>
+        <a:xfrm>
+          <a:off x="0" y="0"/>
+          <a:ext cx="0" cy="0"/>
+          <a:chOff x="0" y="0"/>
+          <a:chExt cx="0" cy="0"/>
+        </a:xfrm>
+      </p:grpSpPr>
+      <p:sp>
+        <p:nvSpPr>
+          <p:cNvPr id="2" name="Title 1">
+            <a:extLst>
+              <a:ext uri="{FF2B5EF4-FFF2-40B4-BE49-F238E27FC236}">
                 <a16:creationId xmlns:a16="http://schemas.microsoft.com/office/drawing/2014/main" id="{30560DB3-CFC0-F242-BBD4-101048CB30E7}"/>
               </a:ext>
             </a:extLst>
@@ -4415,7 +4548,7 @@
 </p:sld>
 </file>
 
-<file path=ppt/slides/slide4.xml><?xml version="1.0" encoding="utf-8"?>
+<file path=ppt/slides/slide5.xml><?xml version="1.0" encoding="utf-8"?>
 <p:sld xmlns:a="http://schemas.openxmlformats.org/drawingml/2006/main" xmlns:r="http://schemas.openxmlformats.org/officeDocument/2006/relationships" xmlns:p="http://schemas.openxmlformats.org/presentationml/2006/main">
   <p:cSld>
     <p:bg>
@@ -4665,329 +4798,6 @@
 </p:sld>
 </file>
 
-<file path=ppt/slides/slide5.xml><?xml version="1.0" encoding="utf-8"?>
-<p:sld xmlns:a="http://schemas.openxmlformats.org/drawingml/2006/main" xmlns:r="http://schemas.openxmlformats.org/officeDocument/2006/relationships" xmlns:p="http://schemas.openxmlformats.org/presentationml/2006/main">
-  <p:cSld>
-    <p:spTree>
-      <p:nvGrpSpPr>
-        <p:cNvPr id="1" name=""/>
-        <p:cNvGrpSpPr/>
-        <p:nvPr/>
-      </p:nvGrpSpPr>
-      <p:grpSpPr>
-        <a:xfrm>
-          <a:off x="0" y="0"/>
-          <a:ext cx="0" cy="0"/>
-          <a:chOff x="0" y="0"/>
-          <a:chExt cx="0" cy="0"/>
-        </a:xfrm>
-      </p:grpSpPr>
-      <p:sp>
-        <p:nvSpPr>
-          <p:cNvPr id="2" name="Title 1">
-            <a:extLst>
-              <a:ext uri="{FF2B5EF4-FFF2-40B4-BE49-F238E27FC236}">
-                <a16:creationId xmlns:a16="http://schemas.microsoft.com/office/drawing/2014/main" id="{8F5CB107-2FE7-EA4D-BBB3-AE0B5AA59982}"/>
-              </a:ext>
-            </a:extLst>
-          </p:cNvPr>
-          <p:cNvSpPr>
-            <a:spLocks noGrp="1"/>
-          </p:cNvSpPr>
-          <p:nvPr>
-            <p:ph type="title"/>
-          </p:nvPr>
-        </p:nvSpPr>
-        <p:spPr/>
-        <p:txBody>
-          <a:bodyPr/>
-          <a:lstStyle/>
-          <a:p>
-            <a:r>
-              <a:rPr lang="en-US" dirty="0"/>
-              <a:t>Results</a:t>
-            </a:r>
-          </a:p>
-        </p:txBody>
-      </p:sp>
-      <p:graphicFrame>
-        <p:nvGraphicFramePr>
-          <p:cNvPr id="10" name="Content Placeholder 9">
-            <a:extLst>
-              <a:ext uri="{FF2B5EF4-FFF2-40B4-BE49-F238E27FC236}">
-                <a16:creationId xmlns:a16="http://schemas.microsoft.com/office/drawing/2014/main" id="{AD6E7ED3-1B65-9642-B956-93F886043398}"/>
-              </a:ext>
-            </a:extLst>
-          </p:cNvPr>
-          <p:cNvGraphicFramePr>
-            <a:graphicFrameLocks noGrp="1"/>
-          </p:cNvGraphicFramePr>
-          <p:nvPr>
-            <p:ph sz="half" idx="2"/>
-            <p:extLst>
-              <p:ext uri="{D42A27DB-BD31-4B8C-83A1-F6EECF244321}">
-                <p14:modId xmlns:p14="http://schemas.microsoft.com/office/powerpoint/2010/main" val="1841187716"/>
-              </p:ext>
-            </p:extLst>
-          </p:nvPr>
-        </p:nvGraphicFramePr>
-        <p:xfrm>
-          <a:off x="6172202" y="3186340"/>
-          <a:ext cx="5181600" cy="1381760"/>
-        </p:xfrm>
-        <a:graphic>
-          <a:graphicData uri="http://schemas.openxmlformats.org/drawingml/2006/table">
-            <a:tbl>
-              <a:tblPr firstRow="1" bandRow="1">
-                <a:tableStyleId>{5C22544A-7EE6-4342-B048-85BDC9FD1C3A}</a:tableStyleId>
-              </a:tblPr>
-              <a:tblGrid>
-                <a:gridCol w="1567543">
-                  <a:extLst>
-                    <a:ext uri="{9D8B030D-6E8A-4147-A177-3AD203B41FA5}">
-                      <a16:colId xmlns:a16="http://schemas.microsoft.com/office/drawing/2014/main" val="2998991604"/>
-                    </a:ext>
-                  </a:extLst>
-                </a:gridCol>
-                <a:gridCol w="1023257">
-                  <a:extLst>
-                    <a:ext uri="{9D8B030D-6E8A-4147-A177-3AD203B41FA5}">
-                      <a16:colId xmlns:a16="http://schemas.microsoft.com/office/drawing/2014/main" val="4041559275"/>
-                    </a:ext>
-                  </a:extLst>
-                </a:gridCol>
-                <a:gridCol w="1295400">
-                  <a:extLst>
-                    <a:ext uri="{9D8B030D-6E8A-4147-A177-3AD203B41FA5}">
-                      <a16:colId xmlns:a16="http://schemas.microsoft.com/office/drawing/2014/main" val="493141102"/>
-                    </a:ext>
-                  </a:extLst>
-                </a:gridCol>
-                <a:gridCol w="1295400">
-                  <a:extLst>
-                    <a:ext uri="{9D8B030D-6E8A-4147-A177-3AD203B41FA5}">
-                      <a16:colId xmlns:a16="http://schemas.microsoft.com/office/drawing/2014/main" val="32539225"/>
-                    </a:ext>
-                  </a:extLst>
-                </a:gridCol>
-              </a:tblGrid>
-              <a:tr h="370840">
-                <a:tc>
-                  <a:txBody>
-                    <a:bodyPr/>
-                    <a:lstStyle/>
-                    <a:p>
-                      <a:r>
-                        <a:rPr lang="en-US" dirty="0"/>
-                        <a:t>Word embedding</a:t>
-                      </a:r>
-                    </a:p>
-                  </a:txBody>
-                  <a:tcPr/>
-                </a:tc>
-                <a:tc>
-                  <a:txBody>
-                    <a:bodyPr/>
-                    <a:lstStyle/>
-                    <a:p>
-                      <a:r>
-                        <a:rPr lang="en-US" dirty="0"/>
-                        <a:t>LSTM</a:t>
-                      </a:r>
-                    </a:p>
-                  </a:txBody>
-                  <a:tcPr/>
-                </a:tc>
-                <a:tc>
-                  <a:txBody>
-                    <a:bodyPr/>
-                    <a:lstStyle/>
-                    <a:p>
-                      <a:r>
-                        <a:rPr lang="en-US" dirty="0"/>
-                        <a:t>GRU</a:t>
-                      </a:r>
-                    </a:p>
-                  </a:txBody>
-                  <a:tcPr/>
-                </a:tc>
-                <a:tc>
-                  <a:txBody>
-                    <a:bodyPr/>
-                    <a:lstStyle/>
-                    <a:p>
-                      <a:r>
-                        <a:rPr lang="en-US" dirty="0"/>
-                        <a:t>RNN</a:t>
-                      </a:r>
-                    </a:p>
-                  </a:txBody>
-                  <a:tcPr/>
-                </a:tc>
-                <a:extLst>
-                  <a:ext uri="{0D108BD9-81ED-4DB2-BD59-A6C34878D82A}">
-                    <a16:rowId xmlns:a16="http://schemas.microsoft.com/office/drawing/2014/main" val="2962131294"/>
-                  </a:ext>
-                </a:extLst>
-              </a:tr>
-              <a:tr h="370840">
-                <a:tc>
-                  <a:txBody>
-                    <a:bodyPr/>
-                    <a:lstStyle/>
-                    <a:p>
-                      <a:r>
-                        <a:rPr lang="en-US" dirty="0"/>
-                        <a:t>Glove vectors</a:t>
-                      </a:r>
-                    </a:p>
-                  </a:txBody>
-                  <a:tcPr/>
-                </a:tc>
-                <a:tc>
-                  <a:txBody>
-                    <a:bodyPr/>
-                    <a:lstStyle/>
-                    <a:p>
-                      <a:r>
-                        <a:rPr lang="en-US"/>
-                        <a:t>0.1639</a:t>
-                      </a:r>
-                      <a:endParaRPr lang="en-US" dirty="0"/>
-                    </a:p>
-                  </a:txBody>
-                  <a:tcPr/>
-                </a:tc>
-                <a:tc>
-                  <a:txBody>
-                    <a:bodyPr/>
-                    <a:lstStyle/>
-                    <a:p>
-                      <a:r>
-                        <a:rPr lang="en-US" dirty="0"/>
-                        <a:t>0.17119</a:t>
-                      </a:r>
-                    </a:p>
-                  </a:txBody>
-                  <a:tcPr/>
-                </a:tc>
-                <a:tc>
-                  <a:txBody>
-                    <a:bodyPr/>
-                    <a:lstStyle/>
-                    <a:p>
-                      <a:r>
-                        <a:rPr lang="en-US" dirty="0"/>
-                        <a:t>0.1839</a:t>
-                      </a:r>
-                    </a:p>
-                  </a:txBody>
-                  <a:tcPr/>
-                </a:tc>
-                <a:extLst>
-                  <a:ext uri="{0D108BD9-81ED-4DB2-BD59-A6C34878D82A}">
-                    <a16:rowId xmlns:a16="http://schemas.microsoft.com/office/drawing/2014/main" val="950546041"/>
-                  </a:ext>
-                </a:extLst>
-              </a:tr>
-              <a:tr h="370840">
-                <a:tc>
-                  <a:txBody>
-                    <a:bodyPr/>
-                    <a:lstStyle/>
-                    <a:p>
-                      <a:r>
-                        <a:rPr lang="en-US" dirty="0"/>
-                        <a:t>Word2vec</a:t>
-                      </a:r>
-                    </a:p>
-                  </a:txBody>
-                  <a:tcPr/>
-                </a:tc>
-                <a:tc>
-                  <a:txBody>
-                    <a:bodyPr/>
-                    <a:lstStyle/>
-                    <a:p>
-                      <a:endParaRPr lang="en-US" dirty="0"/>
-                    </a:p>
-                  </a:txBody>
-                  <a:tcPr/>
-                </a:tc>
-                <a:tc>
-                  <a:txBody>
-                    <a:bodyPr/>
-                    <a:lstStyle/>
-                    <a:p>
-                      <a:endParaRPr lang="en-US"/>
-                    </a:p>
-                  </a:txBody>
-                  <a:tcPr/>
-                </a:tc>
-                <a:tc>
-                  <a:txBody>
-                    <a:bodyPr/>
-                    <a:lstStyle/>
-                    <a:p>
-                      <a:endParaRPr lang="en-US" dirty="0"/>
-                    </a:p>
-                  </a:txBody>
-                  <a:tcPr/>
-                </a:tc>
-                <a:extLst>
-                  <a:ext uri="{0D108BD9-81ED-4DB2-BD59-A6C34878D82A}">
-                    <a16:rowId xmlns:a16="http://schemas.microsoft.com/office/drawing/2014/main" val="611086005"/>
-                  </a:ext>
-                </a:extLst>
-              </a:tr>
-            </a:tbl>
-          </a:graphicData>
-        </a:graphic>
-      </p:graphicFrame>
-      <p:graphicFrame>
-        <p:nvGraphicFramePr>
-          <p:cNvPr id="5" name="Content Placeholder 3">
-            <a:extLst>
-              <a:ext uri="{FF2B5EF4-FFF2-40B4-BE49-F238E27FC236}">
-                <a16:creationId xmlns:a16="http://schemas.microsoft.com/office/drawing/2014/main" id="{EF765AB2-7AC6-5C43-B0D4-E450A6D9AE14}"/>
-              </a:ext>
-            </a:extLst>
-          </p:cNvPr>
-          <p:cNvGraphicFramePr>
-            <a:graphicFrameLocks noGrp="1"/>
-          </p:cNvGraphicFramePr>
-          <p:nvPr>
-            <p:ph sz="half" idx="1"/>
-            <p:extLst>
-              <p:ext uri="{D42A27DB-BD31-4B8C-83A1-F6EECF244321}">
-                <p14:modId xmlns:p14="http://schemas.microsoft.com/office/powerpoint/2010/main" val="1414312900"/>
-              </p:ext>
-            </p:extLst>
-          </p:nvPr>
-        </p:nvGraphicFramePr>
-        <p:xfrm>
-          <a:off x="838200" y="1825625"/>
-          <a:ext cx="5181600" cy="4351338"/>
-        </p:xfrm>
-        <a:graphic>
-          <a:graphicData uri="http://schemas.openxmlformats.org/drawingml/2006/chart">
-            <c:chart xmlns:c="http://schemas.openxmlformats.org/drawingml/2006/chart" xmlns:r="http://schemas.openxmlformats.org/officeDocument/2006/relationships" r:id="rId2"/>
-          </a:graphicData>
-        </a:graphic>
-      </p:graphicFrame>
-    </p:spTree>
-    <p:extLst>
-      <p:ext uri="{BB962C8B-B14F-4D97-AF65-F5344CB8AC3E}">
-        <p14:creationId xmlns:p14="http://schemas.microsoft.com/office/powerpoint/2010/main" val="796724393"/>
-      </p:ext>
-    </p:extLst>
-  </p:cSld>
-  <p:clrMapOvr>
-    <a:masterClrMapping/>
-  </p:clrMapOvr>
-</p:sld>
-</file>
-
 <file path=ppt/slides/slide6.xml><?xml version="1.0" encoding="utf-8"?>
 <p:sld xmlns:a="http://schemas.openxmlformats.org/drawingml/2006/main" xmlns:r="http://schemas.openxmlformats.org/officeDocument/2006/relationships" xmlns:p="http://schemas.openxmlformats.org/presentationml/2006/main">
   <p:cSld>
@@ -5010,7 +4820,7 @@
           <p:cNvPr id="2" name="Title 1">
             <a:extLst>
               <a:ext uri="{FF2B5EF4-FFF2-40B4-BE49-F238E27FC236}">
-                <a16:creationId xmlns:a16="http://schemas.microsoft.com/office/drawing/2014/main" id="{AEC41841-607F-7B40-9F5D-7A64C9B92A50}"/>
+                <a16:creationId xmlns:a16="http://schemas.microsoft.com/office/drawing/2014/main" id="{8F5CB107-2FE7-EA4D-BBB3-AE0B5AA59982}"/>
               </a:ext>
             </a:extLst>
           </p:cNvPr>
@@ -5026,64 +4836,291 @@
           <a:bodyPr/>
           <a:lstStyle/>
           <a:p>
-            <a:endParaRPr lang="en-US" dirty="0"/>
-          </a:p>
-        </p:txBody>
-      </p:sp>
-      <p:sp>
-        <p:nvSpPr>
-          <p:cNvPr id="3" name="Content Placeholder 2">
-            <a:extLst>
-              <a:ext uri="{FF2B5EF4-FFF2-40B4-BE49-F238E27FC236}">
-                <a16:creationId xmlns:a16="http://schemas.microsoft.com/office/drawing/2014/main" id="{2C73A987-3182-FE4C-A270-58858B1A08AF}"/>
-              </a:ext>
-            </a:extLst>
-          </p:cNvPr>
-          <p:cNvSpPr>
-            <a:spLocks noGrp="1"/>
-          </p:cNvSpPr>
+            <a:r>
+              <a:rPr lang="en-US" dirty="0"/>
+              <a:t>Results</a:t>
+            </a:r>
+          </a:p>
+        </p:txBody>
+      </p:sp>
+      <p:graphicFrame>
+        <p:nvGraphicFramePr>
+          <p:cNvPr id="10" name="Content Placeholder 9">
+            <a:extLst>
+              <a:ext uri="{FF2B5EF4-FFF2-40B4-BE49-F238E27FC236}">
+                <a16:creationId xmlns:a16="http://schemas.microsoft.com/office/drawing/2014/main" id="{AD6E7ED3-1B65-9642-B956-93F886043398}"/>
+              </a:ext>
+            </a:extLst>
+          </p:cNvPr>
+          <p:cNvGraphicFramePr>
+            <a:graphicFrameLocks noGrp="1"/>
+          </p:cNvGraphicFramePr>
+          <p:nvPr>
+            <p:ph sz="half" idx="2"/>
+            <p:extLst>
+              <p:ext uri="{D42A27DB-BD31-4B8C-83A1-F6EECF244321}">
+                <p14:modId xmlns:p14="http://schemas.microsoft.com/office/powerpoint/2010/main" val="1145001068"/>
+              </p:ext>
+            </p:extLst>
+          </p:nvPr>
+        </p:nvGraphicFramePr>
+        <p:xfrm>
+          <a:off x="6172202" y="3057525"/>
+          <a:ext cx="5664656" cy="1520388"/>
+        </p:xfrm>
+        <a:graphic>
+          <a:graphicData uri="http://schemas.openxmlformats.org/drawingml/2006/table">
+            <a:tbl>
+              <a:tblPr firstRow="1" bandRow="1">
+                <a:tableStyleId>{5C22544A-7EE6-4342-B048-85BDC9FD1C3A}</a:tableStyleId>
+              </a:tblPr>
+              <a:tblGrid>
+                <a:gridCol w="1713678">
+                  <a:extLst>
+                    <a:ext uri="{9D8B030D-6E8A-4147-A177-3AD203B41FA5}">
+                      <a16:colId xmlns:a16="http://schemas.microsoft.com/office/drawing/2014/main" val="2998991604"/>
+                    </a:ext>
+                  </a:extLst>
+                </a:gridCol>
+                <a:gridCol w="1118650">
+                  <a:extLst>
+                    <a:ext uri="{9D8B030D-6E8A-4147-A177-3AD203B41FA5}">
+                      <a16:colId xmlns:a16="http://schemas.microsoft.com/office/drawing/2014/main" val="4041559275"/>
+                    </a:ext>
+                  </a:extLst>
+                </a:gridCol>
+                <a:gridCol w="1416164">
+                  <a:extLst>
+                    <a:ext uri="{9D8B030D-6E8A-4147-A177-3AD203B41FA5}">
+                      <a16:colId xmlns:a16="http://schemas.microsoft.com/office/drawing/2014/main" val="493141102"/>
+                    </a:ext>
+                  </a:extLst>
+                </a:gridCol>
+                <a:gridCol w="1416164">
+                  <a:extLst>
+                    <a:ext uri="{9D8B030D-6E8A-4147-A177-3AD203B41FA5}">
+                      <a16:colId xmlns:a16="http://schemas.microsoft.com/office/drawing/2014/main" val="32539225"/>
+                    </a:ext>
+                  </a:extLst>
+                </a:gridCol>
+              </a:tblGrid>
+              <a:tr h="699752">
+                <a:tc>
+                  <a:txBody>
+                    <a:bodyPr/>
+                    <a:lstStyle/>
+                    <a:p>
+                      <a:r>
+                        <a:rPr lang="en-US" sz="2000" dirty="0"/>
+                        <a:t>Word embedding</a:t>
+                      </a:r>
+                    </a:p>
+                  </a:txBody>
+                  <a:tcPr marL="99965" marR="99965" marT="49982" marB="49982"/>
+                </a:tc>
+                <a:tc>
+                  <a:txBody>
+                    <a:bodyPr/>
+                    <a:lstStyle/>
+                    <a:p>
+                      <a:r>
+                        <a:rPr lang="en-US" sz="2000" dirty="0"/>
+                        <a:t>LSTM</a:t>
+                      </a:r>
+                    </a:p>
+                  </a:txBody>
+                  <a:tcPr marL="99965" marR="99965" marT="49982" marB="49982"/>
+                </a:tc>
+                <a:tc>
+                  <a:txBody>
+                    <a:bodyPr/>
+                    <a:lstStyle/>
+                    <a:p>
+                      <a:r>
+                        <a:rPr lang="en-US" sz="2000" dirty="0"/>
+                        <a:t>GRU</a:t>
+                      </a:r>
+                    </a:p>
+                  </a:txBody>
+                  <a:tcPr marL="99965" marR="99965" marT="49982" marB="49982"/>
+                </a:tc>
+                <a:tc>
+                  <a:txBody>
+                    <a:bodyPr/>
+                    <a:lstStyle/>
+                    <a:p>
+                      <a:r>
+                        <a:rPr lang="en-US" sz="2000" dirty="0"/>
+                        <a:t>RNN</a:t>
+                      </a:r>
+                    </a:p>
+                  </a:txBody>
+                  <a:tcPr marL="99965" marR="99965" marT="49982" marB="49982"/>
+                </a:tc>
+                <a:extLst>
+                  <a:ext uri="{0D108BD9-81ED-4DB2-BD59-A6C34878D82A}">
+                    <a16:rowId xmlns:a16="http://schemas.microsoft.com/office/drawing/2014/main" val="2962131294"/>
+                  </a:ext>
+                </a:extLst>
+              </a:tr>
+              <a:tr h="405412">
+                <a:tc>
+                  <a:txBody>
+                    <a:bodyPr/>
+                    <a:lstStyle/>
+                    <a:p>
+                      <a:r>
+                        <a:rPr lang="en-US" sz="2000" dirty="0"/>
+                        <a:t>Glove vectors</a:t>
+                      </a:r>
+                    </a:p>
+                  </a:txBody>
+                  <a:tcPr marL="99965" marR="99965" marT="49982" marB="49982"/>
+                </a:tc>
+                <a:tc>
+                  <a:txBody>
+                    <a:bodyPr/>
+                    <a:lstStyle/>
+                    <a:p>
+                      <a:r>
+                        <a:rPr lang="en-US" sz="2000"/>
+                        <a:t>0.1639</a:t>
+                      </a:r>
+                      <a:endParaRPr lang="en-US" sz="2000" dirty="0"/>
+                    </a:p>
+                  </a:txBody>
+                  <a:tcPr marL="99965" marR="99965" marT="49982" marB="49982"/>
+                </a:tc>
+                <a:tc>
+                  <a:txBody>
+                    <a:bodyPr/>
+                    <a:lstStyle/>
+                    <a:p>
+                      <a:r>
+                        <a:rPr lang="en-US" sz="2000" dirty="0"/>
+                        <a:t>0.17119</a:t>
+                      </a:r>
+                    </a:p>
+                  </a:txBody>
+                  <a:tcPr marL="99965" marR="99965" marT="49982" marB="49982"/>
+                </a:tc>
+                <a:tc>
+                  <a:txBody>
+                    <a:bodyPr/>
+                    <a:lstStyle/>
+                    <a:p>
+                      <a:r>
+                        <a:rPr lang="en-US" sz="2000" dirty="0"/>
+                        <a:t>0.1839</a:t>
+                      </a:r>
+                    </a:p>
+                  </a:txBody>
+                  <a:tcPr marL="99965" marR="99965" marT="49982" marB="49982"/>
+                </a:tc>
+                <a:extLst>
+                  <a:ext uri="{0D108BD9-81ED-4DB2-BD59-A6C34878D82A}">
+                    <a16:rowId xmlns:a16="http://schemas.microsoft.com/office/drawing/2014/main" val="950546041"/>
+                  </a:ext>
+                </a:extLst>
+              </a:tr>
+              <a:tr h="405412">
+                <a:tc>
+                  <a:txBody>
+                    <a:bodyPr/>
+                    <a:lstStyle/>
+                    <a:p>
+                      <a:r>
+                        <a:rPr lang="en-US" sz="2000" dirty="0"/>
+                        <a:t>Word2vec</a:t>
+                      </a:r>
+                    </a:p>
+                  </a:txBody>
+                  <a:tcPr marL="99965" marR="99965" marT="49982" marB="49982"/>
+                </a:tc>
+                <a:tc>
+                  <a:txBody>
+                    <a:bodyPr/>
+                    <a:lstStyle/>
+                    <a:p>
+                      <a:r>
+                        <a:rPr lang="en-US" sz="2000" dirty="0"/>
+                        <a:t>0.1692</a:t>
+                      </a:r>
+                    </a:p>
+                  </a:txBody>
+                  <a:tcPr marL="99965" marR="99965" marT="49982" marB="49982"/>
+                </a:tc>
+                <a:tc>
+                  <a:txBody>
+                    <a:bodyPr/>
+                    <a:lstStyle/>
+                    <a:p>
+                      <a:r>
+                        <a:rPr lang="en-US" sz="2000" dirty="0"/>
+                        <a:t>0.17851</a:t>
+                      </a:r>
+                    </a:p>
+                  </a:txBody>
+                  <a:tcPr marL="99965" marR="99965" marT="49982" marB="49982"/>
+                </a:tc>
+                <a:tc>
+                  <a:txBody>
+                    <a:bodyPr/>
+                    <a:lstStyle/>
+                    <a:p>
+                      <a:r>
+                        <a:rPr lang="en-US" sz="2000" dirty="0"/>
+                        <a:t>0.1851</a:t>
+                      </a:r>
+                    </a:p>
+                  </a:txBody>
+                  <a:tcPr marL="99965" marR="99965" marT="49982" marB="49982"/>
+                </a:tc>
+                <a:extLst>
+                  <a:ext uri="{0D108BD9-81ED-4DB2-BD59-A6C34878D82A}">
+                    <a16:rowId xmlns:a16="http://schemas.microsoft.com/office/drawing/2014/main" val="611086005"/>
+                  </a:ext>
+                </a:extLst>
+              </a:tr>
+            </a:tbl>
+          </a:graphicData>
+        </a:graphic>
+      </p:graphicFrame>
+      <p:graphicFrame>
+        <p:nvGraphicFramePr>
+          <p:cNvPr id="5" name="Content Placeholder 3">
+            <a:extLst>
+              <a:ext uri="{FF2B5EF4-FFF2-40B4-BE49-F238E27FC236}">
+                <a16:creationId xmlns:a16="http://schemas.microsoft.com/office/drawing/2014/main" id="{EF765AB2-7AC6-5C43-B0D4-E450A6D9AE14}"/>
+              </a:ext>
+            </a:extLst>
+          </p:cNvPr>
+          <p:cNvGraphicFramePr>
+            <a:graphicFrameLocks noGrp="1"/>
+          </p:cNvGraphicFramePr>
           <p:nvPr>
             <p:ph sz="half" idx="1"/>
-          </p:nvPr>
-        </p:nvSpPr>
-        <p:spPr/>
-        <p:txBody>
-          <a:bodyPr/>
-          <a:lstStyle/>
-          <a:p>
-            <a:endParaRPr lang="en-US"/>
-          </a:p>
-        </p:txBody>
-      </p:sp>
-      <p:sp>
-        <p:nvSpPr>
-          <p:cNvPr id="4" name="Content Placeholder 3">
-            <a:extLst>
-              <a:ext uri="{FF2B5EF4-FFF2-40B4-BE49-F238E27FC236}">
-                <a16:creationId xmlns:a16="http://schemas.microsoft.com/office/drawing/2014/main" id="{DCB48F09-8B48-C840-B87F-52ECE433C95B}"/>
-              </a:ext>
-            </a:extLst>
-          </p:cNvPr>
-          <p:cNvSpPr>
-            <a:spLocks noGrp="1"/>
-          </p:cNvSpPr>
-          <p:nvPr>
-            <p:ph sz="half" idx="2"/>
-          </p:nvPr>
-        </p:nvSpPr>
-        <p:spPr/>
-        <p:txBody>
-          <a:bodyPr/>
-          <a:lstStyle/>
-          <a:p>
-            <a:endParaRPr lang="en-US"/>
-          </a:p>
-        </p:txBody>
-      </p:sp>
+            <p:extLst>
+              <p:ext uri="{D42A27DB-BD31-4B8C-83A1-F6EECF244321}">
+                <p14:modId xmlns:p14="http://schemas.microsoft.com/office/powerpoint/2010/main" val="988467564"/>
+              </p:ext>
+            </p:extLst>
+          </p:nvPr>
+        </p:nvGraphicFramePr>
+        <p:xfrm>
+          <a:off x="838200" y="1825625"/>
+          <a:ext cx="5181600" cy="4351338"/>
+        </p:xfrm>
+        <a:graphic>
+          <a:graphicData uri="http://schemas.openxmlformats.org/drawingml/2006/chart">
+            <c:chart xmlns:c="http://schemas.openxmlformats.org/drawingml/2006/chart" xmlns:r="http://schemas.openxmlformats.org/officeDocument/2006/relationships" r:id="rId2"/>
+          </a:graphicData>
+        </a:graphic>
+      </p:graphicFrame>
     </p:spTree>
     <p:extLst>
       <p:ext uri="{BB962C8B-B14F-4D97-AF65-F5344CB8AC3E}">
-        <p14:creationId xmlns:p14="http://schemas.microsoft.com/office/powerpoint/2010/main" val="2199506947"/>
+        <p14:creationId xmlns:p14="http://schemas.microsoft.com/office/powerpoint/2010/main" val="796724393"/>
       </p:ext>
     </p:extLst>
   </p:cSld>

</xml_diff>